<commit_message>
add one project - WPF. Binding. Updates
</commit_message>
<xml_diff>
--- a/NYC FSharp UG. 2014-08-26/NYC F# UG. 2014-08-26.pptx
+++ b/NYC FSharp UG. 2014-08-26/NYC F# UG. 2014-08-26.pptx
@@ -19,6 +19,7 @@
     <p:sldId id="297" r:id="rId13"/>
     <p:sldId id="304" r:id="rId14"/>
     <p:sldId id="303" r:id="rId15"/>
+    <p:sldId id="306" r:id="rId16"/>
   </p:sldIdLst>
   <p:sldSz cx="12192000" cy="6858000"/>
   <p:notesSz cx="6858000" cy="9144000"/>
@@ -175,7 +176,7 @@
           <a:noFill/>
           <a:extLst>
             <a:ext uri="{909E8E84-426E-40dd-AFC4-6F175D3DCCD1}">
-              <a14:hiddenFill xmlns="" xmlns:a14="http://schemas.microsoft.com/office/drawing/2010/main">
+              <a14:hiddenFill xmlns:a14="http://schemas.microsoft.com/office/drawing/2010/main" xmlns="">
                 <a:solidFill>
                   <a:srgbClr val="FFFFFF"/>
                 </a:solidFill>
@@ -235,7 +236,7 @@
             </a:ln>
             <a:extLst>
               <a:ext uri="{91240B29-F687-4f45-9708-019B960494DF}">
-                <a14:hiddenLine xmlns="" xmlns:a14="http://schemas.microsoft.com/office/drawing/2010/main" w="9525">
+                <a14:hiddenLine xmlns:a14="http://schemas.microsoft.com/office/drawing/2010/main" xmlns="" w="9525">
                   <a:solidFill>
                     <a:srgbClr val="000000"/>
                   </a:solidFill>
@@ -325,7 +326,7 @@
             </a:ln>
             <a:extLst>
               <a:ext uri="{91240B29-F687-4f45-9708-019B960494DF}">
-                <a14:hiddenLine xmlns="" xmlns:a14="http://schemas.microsoft.com/office/drawing/2010/main" w="9525">
+                <a14:hiddenLine xmlns:a14="http://schemas.microsoft.com/office/drawing/2010/main" xmlns="" w="9525">
                   <a:solidFill>
                     <a:srgbClr val="000000"/>
                   </a:solidFill>
@@ -415,7 +416,7 @@
             </a:ln>
             <a:extLst>
               <a:ext uri="{91240B29-F687-4f45-9708-019B960494DF}">
-                <a14:hiddenLine xmlns="" xmlns:a14="http://schemas.microsoft.com/office/drawing/2010/main" w="9525">
+                <a14:hiddenLine xmlns:a14="http://schemas.microsoft.com/office/drawing/2010/main" xmlns="" w="9525">
                   <a:solidFill>
                     <a:srgbClr val="000000"/>
                   </a:solidFill>
@@ -449,7 +450,7 @@
             </a:ln>
             <a:extLst>
               <a:ext uri="{91240B29-F687-4f45-9708-019B960494DF}">
-                <a14:hiddenLine xmlns="" xmlns:a14="http://schemas.microsoft.com/office/drawing/2010/main" w="9525">
+                <a14:hiddenLine xmlns:a14="http://schemas.microsoft.com/office/drawing/2010/main" xmlns="" w="9525">
                   <a:solidFill>
                     <a:srgbClr val="000000"/>
                   </a:solidFill>
@@ -539,7 +540,7 @@
             </a:ln>
             <a:extLst>
               <a:ext uri="{91240B29-F687-4f45-9708-019B960494DF}">
-                <a14:hiddenLine xmlns="" xmlns:a14="http://schemas.microsoft.com/office/drawing/2010/main" w="9525">
+                <a14:hiddenLine xmlns:a14="http://schemas.microsoft.com/office/drawing/2010/main" xmlns="" w="9525">
                   <a:solidFill>
                     <a:srgbClr val="000000"/>
                   </a:solidFill>
@@ -601,7 +602,7 @@
             </a:ln>
             <a:extLst>
               <a:ext uri="{91240B29-F687-4f45-9708-019B960494DF}">
-                <a14:hiddenLine xmlns="" xmlns:a14="http://schemas.microsoft.com/office/drawing/2010/main" w="9525">
+                <a14:hiddenLine xmlns:a14="http://schemas.microsoft.com/office/drawing/2010/main" xmlns="" w="9525">
                   <a:solidFill>
                     <a:srgbClr val="000000"/>
                   </a:solidFill>
@@ -663,7 +664,7 @@
             </a:ln>
             <a:extLst>
               <a:ext uri="{91240B29-F687-4f45-9708-019B960494DF}">
-                <a14:hiddenLine xmlns="" xmlns:a14="http://schemas.microsoft.com/office/drawing/2010/main" w="9525">
+                <a14:hiddenLine xmlns:a14="http://schemas.microsoft.com/office/drawing/2010/main" xmlns="" w="9525">
                   <a:solidFill>
                     <a:srgbClr val="000000"/>
                   </a:solidFill>
@@ -753,7 +754,7 @@
             </a:ln>
             <a:extLst>
               <a:ext uri="{91240B29-F687-4f45-9708-019B960494DF}">
-                <a14:hiddenLine xmlns="" xmlns:a14="http://schemas.microsoft.com/office/drawing/2010/main" w="9525">
+                <a14:hiddenLine xmlns:a14="http://schemas.microsoft.com/office/drawing/2010/main" xmlns="" w="9525">
                   <a:solidFill>
                     <a:srgbClr val="000000"/>
                   </a:solidFill>
@@ -815,7 +816,7 @@
             </a:ln>
             <a:extLst>
               <a:ext uri="{91240B29-F687-4f45-9708-019B960494DF}">
-                <a14:hiddenLine xmlns="" xmlns:a14="http://schemas.microsoft.com/office/drawing/2010/main" w="9525">
+                <a14:hiddenLine xmlns:a14="http://schemas.microsoft.com/office/drawing/2010/main" xmlns="" w="9525">
                   <a:solidFill>
                     <a:srgbClr val="000000"/>
                   </a:solidFill>
@@ -877,7 +878,7 @@
             </a:ln>
             <a:extLst>
               <a:ext uri="{91240B29-F687-4f45-9708-019B960494DF}">
-                <a14:hiddenLine xmlns="" xmlns:a14="http://schemas.microsoft.com/office/drawing/2010/main" w="9525">
+                <a14:hiddenLine xmlns:a14="http://schemas.microsoft.com/office/drawing/2010/main" xmlns="" w="9525">
                   <a:solidFill>
                     <a:srgbClr val="000000"/>
                   </a:solidFill>
@@ -967,7 +968,7 @@
             </a:ln>
             <a:extLst>
               <a:ext uri="{91240B29-F687-4f45-9708-019B960494DF}">
-                <a14:hiddenLine xmlns="" xmlns:a14="http://schemas.microsoft.com/office/drawing/2010/main" w="9525">
+                <a14:hiddenLine xmlns:a14="http://schemas.microsoft.com/office/drawing/2010/main" xmlns="" w="9525">
                   <a:solidFill>
                     <a:srgbClr val="000000"/>
                   </a:solidFill>
@@ -1057,7 +1058,7 @@
             </a:ln>
             <a:extLst>
               <a:ext uri="{91240B29-F687-4f45-9708-019B960494DF}">
-                <a14:hiddenLine xmlns="" xmlns:a14="http://schemas.microsoft.com/office/drawing/2010/main" w="9525">
+                <a14:hiddenLine xmlns:a14="http://schemas.microsoft.com/office/drawing/2010/main" xmlns="" w="9525">
                   <a:solidFill>
                     <a:srgbClr val="000000"/>
                   </a:solidFill>
@@ -1119,7 +1120,7 @@
             </a:ln>
             <a:extLst>
               <a:ext uri="{91240B29-F687-4f45-9708-019B960494DF}">
-                <a14:hiddenLine xmlns="" xmlns:a14="http://schemas.microsoft.com/office/drawing/2010/main" w="9525">
+                <a14:hiddenLine xmlns:a14="http://schemas.microsoft.com/office/drawing/2010/main" xmlns="" w="9525">
                   <a:solidFill>
                     <a:srgbClr val="000000"/>
                   </a:solidFill>
@@ -1229,7 +1230,7 @@
             </a:ln>
             <a:extLst>
               <a:ext uri="{91240B29-F687-4f45-9708-019B960494DF}">
-                <a14:hiddenLine xmlns="" xmlns:a14="http://schemas.microsoft.com/office/drawing/2010/main" w="9525">
+                <a14:hiddenLine xmlns:a14="http://schemas.microsoft.com/office/drawing/2010/main" xmlns="" w="9525">
                   <a:solidFill>
                     <a:srgbClr val="000000"/>
                   </a:solidFill>
@@ -1291,7 +1292,7 @@
             </a:ln>
             <a:extLst>
               <a:ext uri="{91240B29-F687-4f45-9708-019B960494DF}">
-                <a14:hiddenLine xmlns="" xmlns:a14="http://schemas.microsoft.com/office/drawing/2010/main" w="9525">
+                <a14:hiddenLine xmlns:a14="http://schemas.microsoft.com/office/drawing/2010/main" xmlns="" w="9525">
                   <a:solidFill>
                     <a:srgbClr val="000000"/>
                   </a:solidFill>
@@ -1381,7 +1382,7 @@
             </a:ln>
             <a:extLst>
               <a:ext uri="{91240B29-F687-4f45-9708-019B960494DF}">
-                <a14:hiddenLine xmlns="" xmlns:a14="http://schemas.microsoft.com/office/drawing/2010/main" w="9525">
+                <a14:hiddenLine xmlns:a14="http://schemas.microsoft.com/office/drawing/2010/main" xmlns="" w="9525">
                   <a:solidFill>
                     <a:srgbClr val="000000"/>
                   </a:solidFill>
@@ -1471,7 +1472,7 @@
             </a:ln>
             <a:extLst>
               <a:ext uri="{91240B29-F687-4f45-9708-019B960494DF}">
-                <a14:hiddenLine xmlns="" xmlns:a14="http://schemas.microsoft.com/office/drawing/2010/main" w="9525">
+                <a14:hiddenLine xmlns:a14="http://schemas.microsoft.com/office/drawing/2010/main" xmlns="" w="9525">
                   <a:solidFill>
                     <a:srgbClr val="000000"/>
                   </a:solidFill>
@@ -1533,7 +1534,7 @@
             </a:ln>
             <a:extLst>
               <a:ext uri="{91240B29-F687-4f45-9708-019B960494DF}">
-                <a14:hiddenLine xmlns="" xmlns:a14="http://schemas.microsoft.com/office/drawing/2010/main" w="9525">
+                <a14:hiddenLine xmlns:a14="http://schemas.microsoft.com/office/drawing/2010/main" xmlns="" w="9525">
                   <a:solidFill>
                     <a:srgbClr val="000000"/>
                   </a:solidFill>
@@ -1623,7 +1624,7 @@
             </a:ln>
             <a:extLst>
               <a:ext uri="{91240B29-F687-4f45-9708-019B960494DF}">
-                <a14:hiddenLine xmlns="" xmlns:a14="http://schemas.microsoft.com/office/drawing/2010/main" w="9525">
+                <a14:hiddenLine xmlns:a14="http://schemas.microsoft.com/office/drawing/2010/main" xmlns="" w="9525">
                   <a:solidFill>
                     <a:srgbClr val="000000"/>
                   </a:solidFill>
@@ -1713,7 +1714,7 @@
             </a:ln>
             <a:extLst>
               <a:ext uri="{91240B29-F687-4f45-9708-019B960494DF}">
-                <a14:hiddenLine xmlns="" xmlns:a14="http://schemas.microsoft.com/office/drawing/2010/main" w="9525">
+                <a14:hiddenLine xmlns:a14="http://schemas.microsoft.com/office/drawing/2010/main" xmlns="" w="9525">
                   <a:solidFill>
                     <a:srgbClr val="000000"/>
                   </a:solidFill>
@@ -1769,7 +1770,7 @@
             </a:ln>
             <a:extLst>
               <a:ext uri="{91240B29-F687-4f45-9708-019B960494DF}">
-                <a14:hiddenLine xmlns="" xmlns:a14="http://schemas.microsoft.com/office/drawing/2010/main" w="9525">
+                <a14:hiddenLine xmlns:a14="http://schemas.microsoft.com/office/drawing/2010/main" xmlns="" w="9525">
                   <a:solidFill>
                     <a:srgbClr val="000000"/>
                   </a:solidFill>
@@ -1859,7 +1860,7 @@
             </a:ln>
             <a:extLst>
               <a:ext uri="{91240B29-F687-4f45-9708-019B960494DF}">
-                <a14:hiddenLine xmlns="" xmlns:a14="http://schemas.microsoft.com/office/drawing/2010/main" w="9525">
+                <a14:hiddenLine xmlns:a14="http://schemas.microsoft.com/office/drawing/2010/main" xmlns="" w="9525">
                   <a:solidFill>
                     <a:srgbClr val="000000"/>
                   </a:solidFill>
@@ -1915,7 +1916,7 @@
             </a:ln>
             <a:extLst>
               <a:ext uri="{91240B29-F687-4f45-9708-019B960494DF}">
-                <a14:hiddenLine xmlns="" xmlns:a14="http://schemas.microsoft.com/office/drawing/2010/main" w="9525">
+                <a14:hiddenLine xmlns:a14="http://schemas.microsoft.com/office/drawing/2010/main" xmlns="" w="9525">
                   <a:solidFill>
                     <a:srgbClr val="000000"/>
                   </a:solidFill>
@@ -2005,7 +2006,7 @@
             </a:ln>
             <a:extLst>
               <a:ext uri="{91240B29-F687-4f45-9708-019B960494DF}">
-                <a14:hiddenLine xmlns="" xmlns:a14="http://schemas.microsoft.com/office/drawing/2010/main" w="9525">
+                <a14:hiddenLine xmlns:a14="http://schemas.microsoft.com/office/drawing/2010/main" xmlns="" w="9525">
                   <a:solidFill>
                     <a:srgbClr val="000000"/>
                   </a:solidFill>
@@ -2073,7 +2074,7 @@
             </a:ln>
             <a:extLst>
               <a:ext uri="{91240B29-F687-4f45-9708-019B960494DF}">
-                <a14:hiddenLine xmlns="" xmlns:a14="http://schemas.microsoft.com/office/drawing/2010/main" w="9525">
+                <a14:hiddenLine xmlns:a14="http://schemas.microsoft.com/office/drawing/2010/main" xmlns="" w="9525">
                   <a:solidFill>
                     <a:srgbClr val="000000"/>
                   </a:solidFill>
@@ -2163,7 +2164,7 @@
             </a:ln>
             <a:extLst>
               <a:ext uri="{91240B29-F687-4f45-9708-019B960494DF}">
-                <a14:hiddenLine xmlns="" xmlns:a14="http://schemas.microsoft.com/office/drawing/2010/main" w="9525">
+                <a14:hiddenLine xmlns:a14="http://schemas.microsoft.com/office/drawing/2010/main" xmlns="" w="9525">
                   <a:solidFill>
                     <a:srgbClr val="000000"/>
                   </a:solidFill>
@@ -2231,7 +2232,7 @@
             </a:ln>
             <a:extLst>
               <a:ext uri="{91240B29-F687-4f45-9708-019B960494DF}">
-                <a14:hiddenLine xmlns="" xmlns:a14="http://schemas.microsoft.com/office/drawing/2010/main" w="9525">
+                <a14:hiddenLine xmlns:a14="http://schemas.microsoft.com/office/drawing/2010/main" xmlns="" w="9525">
                   <a:solidFill>
                     <a:srgbClr val="000000"/>
                   </a:solidFill>
@@ -2321,7 +2322,7 @@
             </a:ln>
             <a:extLst>
               <a:ext uri="{91240B29-F687-4f45-9708-019B960494DF}">
-                <a14:hiddenLine xmlns="" xmlns:a14="http://schemas.microsoft.com/office/drawing/2010/main" w="9525">
+                <a14:hiddenLine xmlns:a14="http://schemas.microsoft.com/office/drawing/2010/main" xmlns="" w="9525">
                   <a:solidFill>
                     <a:srgbClr val="000000"/>
                   </a:solidFill>
@@ -2355,7 +2356,7 @@
             </a:ln>
             <a:extLst>
               <a:ext uri="{91240B29-F687-4f45-9708-019B960494DF}">
-                <a14:hiddenLine xmlns="" xmlns:a14="http://schemas.microsoft.com/office/drawing/2010/main" w="9525">
+                <a14:hiddenLine xmlns:a14="http://schemas.microsoft.com/office/drawing/2010/main" xmlns="" w="9525">
                   <a:solidFill>
                     <a:srgbClr val="000000"/>
                   </a:solidFill>
@@ -2445,7 +2446,7 @@
             </a:ln>
             <a:extLst>
               <a:ext uri="{91240B29-F687-4f45-9708-019B960494DF}">
-                <a14:hiddenLine xmlns="" xmlns:a14="http://schemas.microsoft.com/office/drawing/2010/main" w="9525">
+                <a14:hiddenLine xmlns:a14="http://schemas.microsoft.com/office/drawing/2010/main" xmlns="" w="9525">
                   <a:solidFill>
                     <a:srgbClr val="000000"/>
                   </a:solidFill>
@@ -2507,7 +2508,7 @@
             </a:ln>
             <a:extLst>
               <a:ext uri="{91240B29-F687-4f45-9708-019B960494DF}">
-                <a14:hiddenLine xmlns="" xmlns:a14="http://schemas.microsoft.com/office/drawing/2010/main" w="9525">
+                <a14:hiddenLine xmlns:a14="http://schemas.microsoft.com/office/drawing/2010/main" xmlns="" w="9525">
                   <a:solidFill>
                     <a:srgbClr val="000000"/>
                   </a:solidFill>
@@ -2569,7 +2570,7 @@
             </a:ln>
             <a:extLst>
               <a:ext uri="{91240B29-F687-4f45-9708-019B960494DF}">
-                <a14:hiddenLine xmlns="" xmlns:a14="http://schemas.microsoft.com/office/drawing/2010/main" w="9525">
+                <a14:hiddenLine xmlns:a14="http://schemas.microsoft.com/office/drawing/2010/main" xmlns="" w="9525">
                   <a:solidFill>
                     <a:srgbClr val="000000"/>
                   </a:solidFill>
@@ -2659,7 +2660,7 @@
             </a:ln>
             <a:extLst>
               <a:ext uri="{91240B29-F687-4f45-9708-019B960494DF}">
-                <a14:hiddenLine xmlns="" xmlns:a14="http://schemas.microsoft.com/office/drawing/2010/main" w="9525">
+                <a14:hiddenLine xmlns:a14="http://schemas.microsoft.com/office/drawing/2010/main" xmlns="" w="9525">
                   <a:solidFill>
                     <a:srgbClr val="000000"/>
                   </a:solidFill>
@@ -2727,7 +2728,7 @@
             </a:ln>
             <a:extLst>
               <a:ext uri="{91240B29-F687-4f45-9708-019B960494DF}">
-                <a14:hiddenLine xmlns="" xmlns:a14="http://schemas.microsoft.com/office/drawing/2010/main" w="9525">
+                <a14:hiddenLine xmlns:a14="http://schemas.microsoft.com/office/drawing/2010/main" xmlns="" w="9525">
                   <a:solidFill>
                     <a:srgbClr val="000000"/>
                   </a:solidFill>
@@ -2789,7 +2790,7 @@
             </a:ln>
             <a:extLst>
               <a:ext uri="{91240B29-F687-4f45-9708-019B960494DF}">
-                <a14:hiddenLine xmlns="" xmlns:a14="http://schemas.microsoft.com/office/drawing/2010/main" w="9525">
+                <a14:hiddenLine xmlns:a14="http://schemas.microsoft.com/office/drawing/2010/main" xmlns="" w="9525">
                   <a:solidFill>
                     <a:srgbClr val="000000"/>
                   </a:solidFill>
@@ -2879,7 +2880,7 @@
             </a:ln>
             <a:extLst>
               <a:ext uri="{91240B29-F687-4f45-9708-019B960494DF}">
-                <a14:hiddenLine xmlns="" xmlns:a14="http://schemas.microsoft.com/office/drawing/2010/main" w="9525">
+                <a14:hiddenLine xmlns:a14="http://schemas.microsoft.com/office/drawing/2010/main" xmlns="" w="9525">
                   <a:solidFill>
                     <a:srgbClr val="000000"/>
                   </a:solidFill>
@@ -2941,7 +2942,7 @@
             </a:ln>
             <a:extLst>
               <a:ext uri="{91240B29-F687-4f45-9708-019B960494DF}">
-                <a14:hiddenLine xmlns="" xmlns:a14="http://schemas.microsoft.com/office/drawing/2010/main" w="9525">
+                <a14:hiddenLine xmlns:a14="http://schemas.microsoft.com/office/drawing/2010/main" xmlns="" w="9525">
                   <a:solidFill>
                     <a:srgbClr val="000000"/>
                   </a:solidFill>
@@ -3031,7 +3032,7 @@
             </a:ln>
             <a:extLst>
               <a:ext uri="{91240B29-F687-4f45-9708-019B960494DF}">
-                <a14:hiddenLine xmlns="" xmlns:a14="http://schemas.microsoft.com/office/drawing/2010/main" w="9525">
+                <a14:hiddenLine xmlns:a14="http://schemas.microsoft.com/office/drawing/2010/main" xmlns="" w="9525">
                   <a:solidFill>
                     <a:srgbClr val="000000"/>
                   </a:solidFill>
@@ -3093,7 +3094,7 @@
             </a:ln>
             <a:extLst>
               <a:ext uri="{91240B29-F687-4f45-9708-019B960494DF}">
-                <a14:hiddenLine xmlns="" xmlns:a14="http://schemas.microsoft.com/office/drawing/2010/main" w="9525">
+                <a14:hiddenLine xmlns:a14="http://schemas.microsoft.com/office/drawing/2010/main" xmlns="" w="9525">
                   <a:solidFill>
                     <a:srgbClr val="000000"/>
                   </a:solidFill>
@@ -3183,7 +3184,7 @@
             </a:ln>
             <a:extLst>
               <a:ext uri="{91240B29-F687-4f45-9708-019B960494DF}">
-                <a14:hiddenLine xmlns="" xmlns:a14="http://schemas.microsoft.com/office/drawing/2010/main" w="9525">
+                <a14:hiddenLine xmlns:a14="http://schemas.microsoft.com/office/drawing/2010/main" xmlns="" w="9525">
                   <a:solidFill>
                     <a:srgbClr val="000000"/>
                   </a:solidFill>
@@ -3217,7 +3218,7 @@
             </a:ln>
             <a:extLst>
               <a:ext uri="{91240B29-F687-4f45-9708-019B960494DF}">
-                <a14:hiddenLine xmlns="" xmlns:a14="http://schemas.microsoft.com/office/drawing/2010/main" w="9525">
+                <a14:hiddenLine xmlns:a14="http://schemas.microsoft.com/office/drawing/2010/main" xmlns="" w="9525">
                   <a:solidFill>
                     <a:srgbClr val="000000"/>
                   </a:solidFill>
@@ -3282,7 +3283,7 @@
             </a:ln>
             <a:extLst>
               <a:ext uri="{91240B29-F687-4f45-9708-019B960494DF}">
-                <a14:hiddenLine xmlns="" xmlns:a14="http://schemas.microsoft.com/office/drawing/2010/main" w="9525">
+                <a14:hiddenLine xmlns:a14="http://schemas.microsoft.com/office/drawing/2010/main" xmlns="" w="9525">
                   <a:solidFill>
                     <a:srgbClr val="000000"/>
                   </a:solidFill>
@@ -3372,7 +3373,7 @@
             </a:ln>
             <a:extLst>
               <a:ext uri="{91240B29-F687-4f45-9708-019B960494DF}">
-                <a14:hiddenLine xmlns="" xmlns:a14="http://schemas.microsoft.com/office/drawing/2010/main" w="9525">
+                <a14:hiddenLine xmlns:a14="http://schemas.microsoft.com/office/drawing/2010/main" xmlns="" w="9525">
                   <a:solidFill>
                     <a:srgbClr val="000000"/>
                   </a:solidFill>
@@ -3434,7 +3435,7 @@
             </a:ln>
             <a:extLst>
               <a:ext uri="{91240B29-F687-4f45-9708-019B960494DF}">
-                <a14:hiddenLine xmlns="" xmlns:a14="http://schemas.microsoft.com/office/drawing/2010/main" w="9525">
+                <a14:hiddenLine xmlns:a14="http://schemas.microsoft.com/office/drawing/2010/main" xmlns="" w="9525">
                   <a:solidFill>
                     <a:srgbClr val="000000"/>
                   </a:solidFill>
@@ -3524,7 +3525,7 @@
             </a:ln>
             <a:extLst>
               <a:ext uri="{91240B29-F687-4f45-9708-019B960494DF}">
-                <a14:hiddenLine xmlns="" xmlns:a14="http://schemas.microsoft.com/office/drawing/2010/main" w="9525">
+                <a14:hiddenLine xmlns:a14="http://schemas.microsoft.com/office/drawing/2010/main" xmlns="" w="9525">
                   <a:solidFill>
                     <a:srgbClr val="000000"/>
                   </a:solidFill>
@@ -3614,7 +3615,7 @@
             </a:ln>
             <a:extLst>
               <a:ext uri="{91240B29-F687-4f45-9708-019B960494DF}">
-                <a14:hiddenLine xmlns="" xmlns:a14="http://schemas.microsoft.com/office/drawing/2010/main" w="9525">
+                <a14:hiddenLine xmlns:a14="http://schemas.microsoft.com/office/drawing/2010/main" xmlns="" w="9525">
                   <a:solidFill>
                     <a:srgbClr val="000000"/>
                   </a:solidFill>
@@ -3679,7 +3680,7 @@
             </a:ln>
             <a:extLst>
               <a:ext uri="{91240B29-F687-4f45-9708-019B960494DF}">
-                <a14:hiddenLine xmlns="" xmlns:a14="http://schemas.microsoft.com/office/drawing/2010/main" w="9525">
+                <a14:hiddenLine xmlns:a14="http://schemas.microsoft.com/office/drawing/2010/main" xmlns="" w="9525">
                   <a:solidFill>
                     <a:srgbClr val="000000"/>
                   </a:solidFill>
@@ -3741,7 +3742,7 @@
             </a:ln>
             <a:extLst>
               <a:ext uri="{91240B29-F687-4f45-9708-019B960494DF}">
-                <a14:hiddenLine xmlns="" xmlns:a14="http://schemas.microsoft.com/office/drawing/2010/main" w="9525">
+                <a14:hiddenLine xmlns:a14="http://schemas.microsoft.com/office/drawing/2010/main" xmlns="" w="9525">
                   <a:solidFill>
                     <a:srgbClr val="000000"/>
                   </a:solidFill>
@@ -3831,7 +3832,7 @@
             </a:ln>
             <a:extLst>
               <a:ext uri="{91240B29-F687-4f45-9708-019B960494DF}">
-                <a14:hiddenLine xmlns="" xmlns:a14="http://schemas.microsoft.com/office/drawing/2010/main" w="9525">
+                <a14:hiddenLine xmlns:a14="http://schemas.microsoft.com/office/drawing/2010/main" xmlns="" w="9525">
                   <a:solidFill>
                     <a:srgbClr val="000000"/>
                   </a:solidFill>
@@ -3921,7 +3922,7 @@
             </a:ln>
             <a:extLst>
               <a:ext uri="{91240B29-F687-4f45-9708-019B960494DF}">
-                <a14:hiddenLine xmlns="" xmlns:a14="http://schemas.microsoft.com/office/drawing/2010/main" w="9525">
+                <a14:hiddenLine xmlns:a14="http://schemas.microsoft.com/office/drawing/2010/main" xmlns="" w="9525">
                   <a:solidFill>
                     <a:srgbClr val="000000"/>
                   </a:solidFill>
@@ -3983,7 +3984,7 @@
             </a:ln>
             <a:extLst>
               <a:ext uri="{91240B29-F687-4f45-9708-019B960494DF}">
-                <a14:hiddenLine xmlns="" xmlns:a14="http://schemas.microsoft.com/office/drawing/2010/main" w="9525">
+                <a14:hiddenLine xmlns:a14="http://schemas.microsoft.com/office/drawing/2010/main" xmlns="" w="9525">
                   <a:solidFill>
                     <a:srgbClr val="000000"/>
                   </a:solidFill>
@@ -4103,7 +4104,7 @@
             </a:ln>
             <a:extLst>
               <a:ext uri="{91240B29-F687-4f45-9708-019B960494DF}">
-                <a14:hiddenLine xmlns="" xmlns:a14="http://schemas.microsoft.com/office/drawing/2010/main" w="9525">
+                <a14:hiddenLine xmlns:a14="http://schemas.microsoft.com/office/drawing/2010/main" xmlns="" w="9525">
                   <a:solidFill>
                     <a:srgbClr val="000000"/>
                   </a:solidFill>
@@ -4171,7 +4172,7 @@
             </a:ln>
             <a:extLst>
               <a:ext uri="{91240B29-F687-4f45-9708-019B960494DF}">
-                <a14:hiddenLine xmlns="" xmlns:a14="http://schemas.microsoft.com/office/drawing/2010/main" w="9525">
+                <a14:hiddenLine xmlns:a14="http://schemas.microsoft.com/office/drawing/2010/main" xmlns="" w="9525">
                   <a:solidFill>
                     <a:srgbClr val="000000"/>
                   </a:solidFill>
@@ -4261,7 +4262,7 @@
             </a:ln>
             <a:extLst>
               <a:ext uri="{91240B29-F687-4f45-9708-019B960494DF}">
-                <a14:hiddenLine xmlns="" xmlns:a14="http://schemas.microsoft.com/office/drawing/2010/main" w="9525">
+                <a14:hiddenLine xmlns:a14="http://schemas.microsoft.com/office/drawing/2010/main" xmlns="" w="9525">
                   <a:solidFill>
                     <a:srgbClr val="000000"/>
                   </a:solidFill>
@@ -9102,7 +9103,7 @@
           <a:noFill/>
           <a:extLst>
             <a:ext uri="{909E8E84-426E-40dd-AFC4-6F175D3DCCD1}">
-              <a14:hiddenFill xmlns="" xmlns:a14="http://schemas.microsoft.com/office/drawing/2010/main">
+              <a14:hiddenFill xmlns:a14="http://schemas.microsoft.com/office/drawing/2010/main" xmlns="">
                 <a:solidFill>
                   <a:srgbClr val="FFFFFF"/>
                 </a:solidFill>
@@ -9176,7 +9177,7 @@
               </a:ln>
               <a:extLst>
                 <a:ext uri="{91240B29-F687-4f45-9708-019B960494DF}">
-                  <a14:hiddenLine xmlns="" xmlns:a14="http://schemas.microsoft.com/office/drawing/2010/main" w="9525">
+                  <a14:hiddenLine xmlns:a14="http://schemas.microsoft.com/office/drawing/2010/main" xmlns="" w="9525">
                     <a:solidFill>
                       <a:srgbClr val="000000"/>
                     </a:solidFill>
@@ -9266,7 +9267,7 @@
               </a:ln>
               <a:extLst>
                 <a:ext uri="{91240B29-F687-4f45-9708-019B960494DF}">
-                  <a14:hiddenLine xmlns="" xmlns:a14="http://schemas.microsoft.com/office/drawing/2010/main" w="9525">
+                  <a14:hiddenLine xmlns:a14="http://schemas.microsoft.com/office/drawing/2010/main" xmlns="" w="9525">
                     <a:solidFill>
                       <a:srgbClr val="000000"/>
                     </a:solidFill>
@@ -9356,7 +9357,7 @@
               </a:ln>
               <a:extLst>
                 <a:ext uri="{91240B29-F687-4f45-9708-019B960494DF}">
-                  <a14:hiddenLine xmlns="" xmlns:a14="http://schemas.microsoft.com/office/drawing/2010/main" w="9525">
+                  <a14:hiddenLine xmlns:a14="http://schemas.microsoft.com/office/drawing/2010/main" xmlns="" w="9525">
                     <a:solidFill>
                       <a:srgbClr val="000000"/>
                     </a:solidFill>
@@ -9418,7 +9419,7 @@
               </a:ln>
               <a:extLst>
                 <a:ext uri="{91240B29-F687-4f45-9708-019B960494DF}">
-                  <a14:hiddenLine xmlns="" xmlns:a14="http://schemas.microsoft.com/office/drawing/2010/main" w="9525">
+                  <a14:hiddenLine xmlns:a14="http://schemas.microsoft.com/office/drawing/2010/main" xmlns="" w="9525">
                     <a:solidFill>
                       <a:srgbClr val="000000"/>
                     </a:solidFill>
@@ -9508,7 +9509,7 @@
               </a:ln>
               <a:extLst>
                 <a:ext uri="{91240B29-F687-4f45-9708-019B960494DF}">
-                  <a14:hiddenLine xmlns="" xmlns:a14="http://schemas.microsoft.com/office/drawing/2010/main" w="9525">
+                  <a14:hiddenLine xmlns:a14="http://schemas.microsoft.com/office/drawing/2010/main" xmlns="" w="9525">
                     <a:solidFill>
                       <a:srgbClr val="000000"/>
                     </a:solidFill>
@@ -9570,7 +9571,7 @@
               </a:ln>
               <a:extLst>
                 <a:ext uri="{91240B29-F687-4f45-9708-019B960494DF}">
-                  <a14:hiddenLine xmlns="" xmlns:a14="http://schemas.microsoft.com/office/drawing/2010/main" w="9525">
+                  <a14:hiddenLine xmlns:a14="http://schemas.microsoft.com/office/drawing/2010/main" xmlns="" w="9525">
                     <a:solidFill>
                       <a:srgbClr val="000000"/>
                     </a:solidFill>
@@ -9632,7 +9633,7 @@
               </a:ln>
               <a:extLst>
                 <a:ext uri="{91240B29-F687-4f45-9708-019B960494DF}">
-                  <a14:hiddenLine xmlns="" xmlns:a14="http://schemas.microsoft.com/office/drawing/2010/main" w="9525">
+                  <a14:hiddenLine xmlns:a14="http://schemas.microsoft.com/office/drawing/2010/main" xmlns="" w="9525">
                     <a:solidFill>
                       <a:srgbClr val="000000"/>
                     </a:solidFill>
@@ -9722,7 +9723,7 @@
               </a:ln>
               <a:extLst>
                 <a:ext uri="{91240B29-F687-4f45-9708-019B960494DF}">
-                  <a14:hiddenLine xmlns="" xmlns:a14="http://schemas.microsoft.com/office/drawing/2010/main" w="9525">
+                  <a14:hiddenLine xmlns:a14="http://schemas.microsoft.com/office/drawing/2010/main" xmlns="" w="9525">
                     <a:solidFill>
                       <a:srgbClr val="000000"/>
                     </a:solidFill>
@@ -9812,7 +9813,7 @@
               </a:ln>
               <a:extLst>
                 <a:ext uri="{91240B29-F687-4f45-9708-019B960494DF}">
-                  <a14:hiddenLine xmlns="" xmlns:a14="http://schemas.microsoft.com/office/drawing/2010/main" w="9525">
+                  <a14:hiddenLine xmlns:a14="http://schemas.microsoft.com/office/drawing/2010/main" xmlns="" w="9525">
                     <a:solidFill>
                       <a:srgbClr val="000000"/>
                     </a:solidFill>
@@ -9874,7 +9875,7 @@
               </a:ln>
               <a:extLst>
                 <a:ext uri="{91240B29-F687-4f45-9708-019B960494DF}">
-                  <a14:hiddenLine xmlns="" xmlns:a14="http://schemas.microsoft.com/office/drawing/2010/main" w="9525">
+                  <a14:hiddenLine xmlns:a14="http://schemas.microsoft.com/office/drawing/2010/main" xmlns="" w="9525">
                     <a:solidFill>
                       <a:srgbClr val="000000"/>
                     </a:solidFill>
@@ -9984,7 +9985,7 @@
               </a:ln>
               <a:extLst>
                 <a:ext uri="{91240B29-F687-4f45-9708-019B960494DF}">
-                  <a14:hiddenLine xmlns="" xmlns:a14="http://schemas.microsoft.com/office/drawing/2010/main" w="9525">
+                  <a14:hiddenLine xmlns:a14="http://schemas.microsoft.com/office/drawing/2010/main" xmlns="" w="9525">
                     <a:solidFill>
                       <a:srgbClr val="000000"/>
                     </a:solidFill>
@@ -10068,7 +10069,7 @@
               </a:ln>
               <a:extLst>
                 <a:ext uri="{91240B29-F687-4f45-9708-019B960494DF}">
-                  <a14:hiddenLine xmlns="" xmlns:a14="http://schemas.microsoft.com/office/drawing/2010/main" w="9525">
+                  <a14:hiddenLine xmlns:a14="http://schemas.microsoft.com/office/drawing/2010/main" xmlns="" w="9525">
                     <a:solidFill>
                       <a:srgbClr val="000000"/>
                     </a:solidFill>
@@ -10130,7 +10131,7 @@
               </a:ln>
               <a:extLst>
                 <a:ext uri="{91240B29-F687-4f45-9708-019B960494DF}">
-                  <a14:hiddenLine xmlns="" xmlns:a14="http://schemas.microsoft.com/office/drawing/2010/main" w="9525">
+                  <a14:hiddenLine xmlns:a14="http://schemas.microsoft.com/office/drawing/2010/main" xmlns="" w="9525">
                     <a:solidFill>
                       <a:srgbClr val="000000"/>
                     </a:solidFill>
@@ -10192,7 +10193,7 @@
               </a:ln>
               <a:extLst>
                 <a:ext uri="{91240B29-F687-4f45-9708-019B960494DF}">
-                  <a14:hiddenLine xmlns="" xmlns:a14="http://schemas.microsoft.com/office/drawing/2010/main" w="9525">
+                  <a14:hiddenLine xmlns:a14="http://schemas.microsoft.com/office/drawing/2010/main" xmlns="" w="9525">
                     <a:solidFill>
                       <a:srgbClr val="000000"/>
                     </a:solidFill>
@@ -10282,7 +10283,7 @@
               </a:ln>
               <a:extLst>
                 <a:ext uri="{91240B29-F687-4f45-9708-019B960494DF}">
-                  <a14:hiddenLine xmlns="" xmlns:a14="http://schemas.microsoft.com/office/drawing/2010/main" w="9525">
+                  <a14:hiddenLine xmlns:a14="http://schemas.microsoft.com/office/drawing/2010/main" xmlns="" w="9525">
                     <a:solidFill>
                       <a:srgbClr val="000000"/>
                     </a:solidFill>
@@ -10316,7 +10317,7 @@
               </a:ln>
               <a:extLst>
                 <a:ext uri="{91240B29-F687-4f45-9708-019B960494DF}">
-                  <a14:hiddenLine xmlns="" xmlns:a14="http://schemas.microsoft.com/office/drawing/2010/main" w="9525">
+                  <a14:hiddenLine xmlns:a14="http://schemas.microsoft.com/office/drawing/2010/main" xmlns="" w="9525">
                     <a:solidFill>
                       <a:srgbClr val="000000"/>
                     </a:solidFill>
@@ -10381,7 +10382,7 @@
               </a:ln>
               <a:extLst>
                 <a:ext uri="{91240B29-F687-4f45-9708-019B960494DF}">
-                  <a14:hiddenLine xmlns="" xmlns:a14="http://schemas.microsoft.com/office/drawing/2010/main" w="9525">
+                  <a14:hiddenLine xmlns:a14="http://schemas.microsoft.com/office/drawing/2010/main" xmlns="" w="9525">
                     <a:solidFill>
                       <a:srgbClr val="000000"/>
                     </a:solidFill>
@@ -10471,7 +10472,7 @@
               </a:ln>
               <a:extLst>
                 <a:ext uri="{91240B29-F687-4f45-9708-019B960494DF}">
-                  <a14:hiddenLine xmlns="" xmlns:a14="http://schemas.microsoft.com/office/drawing/2010/main" w="9525">
+                  <a14:hiddenLine xmlns:a14="http://schemas.microsoft.com/office/drawing/2010/main" xmlns="" w="9525">
                     <a:solidFill>
                       <a:srgbClr val="000000"/>
                     </a:solidFill>
@@ -10533,7 +10534,7 @@
               </a:ln>
               <a:extLst>
                 <a:ext uri="{91240B29-F687-4f45-9708-019B960494DF}">
-                  <a14:hiddenLine xmlns="" xmlns:a14="http://schemas.microsoft.com/office/drawing/2010/main" w="9525">
+                  <a14:hiddenLine xmlns:a14="http://schemas.microsoft.com/office/drawing/2010/main" xmlns="" w="9525">
                     <a:solidFill>
                       <a:srgbClr val="000000"/>
                     </a:solidFill>
@@ -10623,7 +10624,7 @@
               </a:ln>
               <a:extLst>
                 <a:ext uri="{91240B29-F687-4f45-9708-019B960494DF}">
-                  <a14:hiddenLine xmlns="" xmlns:a14="http://schemas.microsoft.com/office/drawing/2010/main" w="9525">
+                  <a14:hiddenLine xmlns:a14="http://schemas.microsoft.com/office/drawing/2010/main" xmlns="" w="9525">
                     <a:solidFill>
                       <a:srgbClr val="000000"/>
                     </a:solidFill>
@@ -10688,7 +10689,7 @@
               </a:ln>
               <a:extLst>
                 <a:ext uri="{91240B29-F687-4f45-9708-019B960494DF}">
-                  <a14:hiddenLine xmlns="" xmlns:a14="http://schemas.microsoft.com/office/drawing/2010/main" w="9525">
+                  <a14:hiddenLine xmlns:a14="http://schemas.microsoft.com/office/drawing/2010/main" xmlns="" w="9525">
                     <a:solidFill>
                       <a:srgbClr val="000000"/>
                     </a:solidFill>
@@ -10750,7 +10751,7 @@
               </a:ln>
               <a:extLst>
                 <a:ext uri="{91240B29-F687-4f45-9708-019B960494DF}">
-                  <a14:hiddenLine xmlns="" xmlns:a14="http://schemas.microsoft.com/office/drawing/2010/main" w="9525">
+                  <a14:hiddenLine xmlns:a14="http://schemas.microsoft.com/office/drawing/2010/main" xmlns="" w="9525">
                     <a:solidFill>
                       <a:srgbClr val="000000"/>
                     </a:solidFill>
@@ -10840,7 +10841,7 @@
               </a:ln>
               <a:extLst>
                 <a:ext uri="{91240B29-F687-4f45-9708-019B960494DF}">
-                  <a14:hiddenLine xmlns="" xmlns:a14="http://schemas.microsoft.com/office/drawing/2010/main" w="9525">
+                  <a14:hiddenLine xmlns:a14="http://schemas.microsoft.com/office/drawing/2010/main" xmlns="" w="9525">
                     <a:solidFill>
                       <a:srgbClr val="000000"/>
                     </a:solidFill>
@@ -10930,7 +10931,7 @@
               </a:ln>
               <a:extLst>
                 <a:ext uri="{91240B29-F687-4f45-9708-019B960494DF}">
-                  <a14:hiddenLine xmlns="" xmlns:a14="http://schemas.microsoft.com/office/drawing/2010/main" w="9525">
+                  <a14:hiddenLine xmlns:a14="http://schemas.microsoft.com/office/drawing/2010/main" xmlns="" w="9525">
                     <a:solidFill>
                       <a:srgbClr val="000000"/>
                     </a:solidFill>
@@ -10995,7 +10996,7 @@
               </a:ln>
               <a:extLst>
                 <a:ext uri="{91240B29-F687-4f45-9708-019B960494DF}">
-                  <a14:hiddenLine xmlns="" xmlns:a14="http://schemas.microsoft.com/office/drawing/2010/main" w="9525">
+                  <a14:hiddenLine xmlns:a14="http://schemas.microsoft.com/office/drawing/2010/main" xmlns="" w="9525">
                     <a:solidFill>
                       <a:srgbClr val="000000"/>
                     </a:solidFill>
@@ -11115,7 +11116,7 @@
               </a:ln>
               <a:extLst>
                 <a:ext uri="{91240B29-F687-4f45-9708-019B960494DF}">
-                  <a14:hiddenLine xmlns="" xmlns:a14="http://schemas.microsoft.com/office/drawing/2010/main" w="9525">
+                  <a14:hiddenLine xmlns:a14="http://schemas.microsoft.com/office/drawing/2010/main" xmlns="" w="9525">
                     <a:solidFill>
                       <a:srgbClr val="000000"/>
                     </a:solidFill>
@@ -11213,7 +11214,7 @@
               </a:ln>
               <a:extLst>
                 <a:ext uri="{91240B29-F687-4f45-9708-019B960494DF}">
-                  <a14:hiddenLine xmlns="" xmlns:a14="http://schemas.microsoft.com/office/drawing/2010/main" w="9525">
+                  <a14:hiddenLine xmlns:a14="http://schemas.microsoft.com/office/drawing/2010/main" xmlns="" w="9525">
                     <a:solidFill>
                       <a:srgbClr val="000000"/>
                     </a:solidFill>
@@ -11328,7 +11329,7 @@
               </a:ln>
               <a:extLst>
                 <a:ext uri="{91240B29-F687-4f45-9708-019B960494DF}">
-                  <a14:hiddenLine xmlns="" xmlns:a14="http://schemas.microsoft.com/office/drawing/2010/main" w="9525">
+                  <a14:hiddenLine xmlns:a14="http://schemas.microsoft.com/office/drawing/2010/main" xmlns="" w="9525">
                     <a:solidFill>
                       <a:srgbClr val="000000"/>
                     </a:solidFill>
@@ -11418,7 +11419,7 @@
               </a:ln>
               <a:extLst>
                 <a:ext uri="{91240B29-F687-4f45-9708-019B960494DF}">
-                  <a14:hiddenLine xmlns="" xmlns:a14="http://schemas.microsoft.com/office/drawing/2010/main" w="9525">
+                  <a14:hiddenLine xmlns:a14="http://schemas.microsoft.com/office/drawing/2010/main" xmlns="" w="9525">
                     <a:solidFill>
                       <a:srgbClr val="000000"/>
                     </a:solidFill>
@@ -11483,7 +11484,7 @@
               </a:ln>
               <a:extLst>
                 <a:ext uri="{91240B29-F687-4f45-9708-019B960494DF}">
-                  <a14:hiddenLine xmlns="" xmlns:a14="http://schemas.microsoft.com/office/drawing/2010/main" w="9525">
+                  <a14:hiddenLine xmlns:a14="http://schemas.microsoft.com/office/drawing/2010/main" xmlns="" w="9525">
                     <a:solidFill>
                       <a:srgbClr val="000000"/>
                     </a:solidFill>
@@ -11573,7 +11574,7 @@
               </a:ln>
               <a:extLst>
                 <a:ext uri="{91240B29-F687-4f45-9708-019B960494DF}">
-                  <a14:hiddenLine xmlns="" xmlns:a14="http://schemas.microsoft.com/office/drawing/2010/main" w="9525">
+                  <a14:hiddenLine xmlns:a14="http://schemas.microsoft.com/office/drawing/2010/main" xmlns="" w="9525">
                     <a:solidFill>
                       <a:srgbClr val="000000"/>
                     </a:solidFill>
@@ -11641,7 +11642,7 @@
               </a:ln>
               <a:extLst>
                 <a:ext uri="{91240B29-F687-4f45-9708-019B960494DF}">
-                  <a14:hiddenLine xmlns="" xmlns:a14="http://schemas.microsoft.com/office/drawing/2010/main" w="9525">
+                  <a14:hiddenLine xmlns:a14="http://schemas.microsoft.com/office/drawing/2010/main" xmlns="" w="9525">
                     <a:solidFill>
                       <a:srgbClr val="000000"/>
                     </a:solidFill>
@@ -11731,7 +11732,7 @@
               </a:ln>
               <a:extLst>
                 <a:ext uri="{91240B29-F687-4f45-9708-019B960494DF}">
-                  <a14:hiddenLine xmlns="" xmlns:a14="http://schemas.microsoft.com/office/drawing/2010/main" w="9525">
+                  <a14:hiddenLine xmlns:a14="http://schemas.microsoft.com/office/drawing/2010/main" xmlns="" w="9525">
                     <a:solidFill>
                       <a:srgbClr val="000000"/>
                     </a:solidFill>
@@ -11799,7 +11800,7 @@
               </a:ln>
               <a:extLst>
                 <a:ext uri="{91240B29-F687-4f45-9708-019B960494DF}">
-                  <a14:hiddenLine xmlns="" xmlns:a14="http://schemas.microsoft.com/office/drawing/2010/main" w="9525">
+                  <a14:hiddenLine xmlns:a14="http://schemas.microsoft.com/office/drawing/2010/main" xmlns="" w="9525">
                     <a:solidFill>
                       <a:srgbClr val="000000"/>
                     </a:solidFill>
@@ -11889,7 +11890,7 @@
               </a:ln>
               <a:extLst>
                 <a:ext uri="{91240B29-F687-4f45-9708-019B960494DF}">
-                  <a14:hiddenLine xmlns="" xmlns:a14="http://schemas.microsoft.com/office/drawing/2010/main" w="9525">
+                  <a14:hiddenLine xmlns:a14="http://schemas.microsoft.com/office/drawing/2010/main" xmlns="" w="9525">
                     <a:solidFill>
                       <a:srgbClr val="000000"/>
                     </a:solidFill>
@@ -11923,7 +11924,7 @@
               </a:ln>
               <a:extLst>
                 <a:ext uri="{91240B29-F687-4f45-9708-019B960494DF}">
-                  <a14:hiddenLine xmlns="" xmlns:a14="http://schemas.microsoft.com/office/drawing/2010/main" w="9525">
+                  <a14:hiddenLine xmlns:a14="http://schemas.microsoft.com/office/drawing/2010/main" xmlns="" w="9525">
                     <a:solidFill>
                       <a:srgbClr val="000000"/>
                     </a:solidFill>
@@ -13183,6 +13184,117 @@
       </p:par>
     </p:tnLst>
   </p:timing>
+</p:sld>
+</file>
+
+<file path=ppt/slides/slide15.xml><?xml version="1.0" encoding="utf-8"?>
+<p:sld xmlns:a="http://schemas.openxmlformats.org/drawingml/2006/main" xmlns:r="http://schemas.openxmlformats.org/officeDocument/2006/relationships" xmlns:p="http://schemas.openxmlformats.org/presentationml/2006/main">
+  <p:cSld>
+    <p:spTree>
+      <p:nvGrpSpPr>
+        <p:cNvPr id="1" name=""/>
+        <p:cNvGrpSpPr/>
+        <p:nvPr/>
+      </p:nvGrpSpPr>
+      <p:grpSpPr>
+        <a:xfrm>
+          <a:off x="0" y="0"/>
+          <a:ext cx="0" cy="0"/>
+          <a:chOff x="0" y="0"/>
+          <a:chExt cx="0" cy="0"/>
+        </a:xfrm>
+      </p:grpSpPr>
+      <p:sp>
+        <p:nvSpPr>
+          <p:cNvPr id="2" name="Title 1"/>
+          <p:cNvSpPr>
+            <a:spLocks noGrp="1"/>
+          </p:cNvSpPr>
+          <p:nvPr>
+            <p:ph type="title"/>
+          </p:nvPr>
+        </p:nvSpPr>
+        <p:spPr/>
+        <p:txBody>
+          <a:bodyPr/>
+          <a:lstStyle/>
+          <a:p>
+            <a:r>
+              <a:rPr lang="en-US" dirty="0" smtClean="0"/>
+              <a:t>SUMMARY</a:t>
+            </a:r>
+            <a:endParaRPr lang="en-US" dirty="0"/>
+          </a:p>
+        </p:txBody>
+      </p:sp>
+      <p:sp>
+        <p:nvSpPr>
+          <p:cNvPr id="3" name="Content Placeholder 2"/>
+          <p:cNvSpPr>
+            <a:spLocks noGrp="1"/>
+          </p:cNvSpPr>
+          <p:nvPr>
+            <p:ph idx="1"/>
+          </p:nvPr>
+        </p:nvSpPr>
+        <p:spPr/>
+        <p:txBody>
+          <a:bodyPr/>
+          <a:lstStyle/>
+          <a:p>
+            <a:r>
+              <a:rPr lang="en-US" dirty="0" smtClean="0"/>
+              <a:t>Data access in T-SQL can be pleasant exercise </a:t>
+            </a:r>
+          </a:p>
+          <a:p>
+            <a:r>
+              <a:rPr lang="en-US" dirty="0">
+                <a:hlinkClick r:id="rId2"/>
+              </a:rPr>
+              <a:t>http://fsprojects.github.io/FSharp.Data.SqlClient</a:t>
+            </a:r>
+            <a:r>
+              <a:rPr lang="en-US" dirty="0" smtClean="0">
+                <a:hlinkClick r:id="rId2"/>
+              </a:rPr>
+              <a:t>/</a:t>
+            </a:r>
+            <a:endParaRPr lang="en-US" dirty="0" smtClean="0"/>
+          </a:p>
+          <a:p>
+            <a:pPr lvl="1"/>
+            <a:r>
+              <a:rPr lang="en-US" dirty="0" smtClean="0"/>
+              <a:t>Quite good docs and sample projects</a:t>
+            </a:r>
+          </a:p>
+          <a:p>
+            <a:pPr lvl="1"/>
+            <a:r>
+              <a:rPr lang="en-US" dirty="0" smtClean="0"/>
+              <a:t>Follows F# </a:t>
+            </a:r>
+            <a:r>
+              <a:rPr lang="en-US" smtClean="0"/>
+              <a:t>OSS standards</a:t>
+            </a:r>
+          </a:p>
+          <a:p>
+            <a:endParaRPr lang="en-US" dirty="0"/>
+          </a:p>
+        </p:txBody>
+      </p:sp>
+    </p:spTree>
+    <p:extLst>
+      <p:ext uri="{BB962C8B-B14F-4D97-AF65-F5344CB8AC3E}">
+        <p14:creationId xmlns:p14="http://schemas.microsoft.com/office/powerpoint/2010/main" val="3647999800"/>
+      </p:ext>
+    </p:extLst>
+  </p:cSld>
+  <p:clrMapOvr>
+    <a:masterClrMapping/>
+  </p:clrMapOvr>
 </p:sld>
 </file>
 

</xml_diff>